<commit_message>
Update firewall verification concepts PPT and Readme
</commit_message>
<xml_diff>
--- a/open-platform-models/firewall-simple/firewall-spec-verification-concepts.pptx
+++ b/open-platform-models/firewall-simple/firewall-spec-verification-concepts.pptx
@@ -5903,6 +5903,47 @@
           </a:p>
         </p:txBody>
       </p:sp>
+      <p:sp>
+        <p:nvSpPr>
+          <p:cNvPr id="48" name="TextBox 47">
+            <a:extLst>
+              <a:ext uri="{FF2B5EF4-FFF2-40B4-BE49-F238E27FC236}">
+                <a16:creationId xmlns:a16="http://schemas.microsoft.com/office/drawing/2014/main" id="{0B72CD18-E5F1-81D4-5697-B56D44D1F8CE}"/>
+              </a:ext>
+            </a:extLst>
+          </p:cNvPr>
+          <p:cNvSpPr txBox="1"/>
+          <p:nvPr/>
+        </p:nvSpPr>
+        <p:spPr>
+          <a:xfrm>
+            <a:off x="3791923" y="2769030"/>
+            <a:ext cx="1776448" cy="584775"/>
+          </a:xfrm>
+          <a:prstGeom prst="rect">
+            <a:avLst/>
+          </a:prstGeom>
+          <a:noFill/>
+        </p:spPr>
+        <p:txBody>
+          <a:bodyPr wrap="none" rtlCol="0">
+            <a:spAutoFit/>
+          </a:bodyPr>
+          <a:lstStyle/>
+          <a:p>
+            <a:r>
+              <a:rPr lang="en-US" sz="1600" i="1" dirty="0"/>
+              <a:t>Firewall</a:t>
+            </a:r>
+          </a:p>
+          <a:p>
+            <a:r>
+              <a:rPr lang="en-US" sz="1600" i="1" dirty="0"/>
+              <a:t>AADL Component</a:t>
+            </a:r>
+          </a:p>
+        </p:txBody>
+      </p:sp>
     </p:spTree>
     <p:extLst>
       <p:ext uri="{BB962C8B-B14F-4D97-AF65-F5344CB8AC3E}">
@@ -7358,6 +7399,47 @@
           </a:p>
         </p:txBody>
       </p:sp>
+      <p:sp>
+        <p:nvSpPr>
+          <p:cNvPr id="63" name="TextBox 62">
+            <a:extLst>
+              <a:ext uri="{FF2B5EF4-FFF2-40B4-BE49-F238E27FC236}">
+                <a16:creationId xmlns:a16="http://schemas.microsoft.com/office/drawing/2014/main" id="{66F986DE-BB1A-F101-9718-DBA2D3F92B7F}"/>
+              </a:ext>
+            </a:extLst>
+          </p:cNvPr>
+          <p:cNvSpPr txBox="1"/>
+          <p:nvPr/>
+        </p:nvSpPr>
+        <p:spPr>
+          <a:xfrm>
+            <a:off x="3791923" y="2769030"/>
+            <a:ext cx="1776448" cy="584775"/>
+          </a:xfrm>
+          <a:prstGeom prst="rect">
+            <a:avLst/>
+          </a:prstGeom>
+          <a:noFill/>
+        </p:spPr>
+        <p:txBody>
+          <a:bodyPr wrap="none" rtlCol="0">
+            <a:spAutoFit/>
+          </a:bodyPr>
+          <a:lstStyle/>
+          <a:p>
+            <a:r>
+              <a:rPr lang="en-US" sz="1600" i="1" dirty="0"/>
+              <a:t>Firewall</a:t>
+            </a:r>
+          </a:p>
+          <a:p>
+            <a:r>
+              <a:rPr lang="en-US" sz="1600" i="1" dirty="0"/>
+              <a:t>AADL Component</a:t>
+            </a:r>
+          </a:p>
+        </p:txBody>
+      </p:sp>
     </p:spTree>
     <p:extLst>
       <p:ext uri="{BB962C8B-B14F-4D97-AF65-F5344CB8AC3E}">
@@ -9161,6 +9243,47 @@
           </a:p>
         </p:txBody>
       </p:sp>
+      <p:sp>
+        <p:nvSpPr>
+          <p:cNvPr id="18" name="TextBox 17">
+            <a:extLst>
+              <a:ext uri="{FF2B5EF4-FFF2-40B4-BE49-F238E27FC236}">
+                <a16:creationId xmlns:a16="http://schemas.microsoft.com/office/drawing/2014/main" id="{76E5FED7-798F-A2CB-54C3-F308511C417C}"/>
+              </a:ext>
+            </a:extLst>
+          </p:cNvPr>
+          <p:cNvSpPr txBox="1"/>
+          <p:nvPr/>
+        </p:nvSpPr>
+        <p:spPr>
+          <a:xfrm>
+            <a:off x="3791923" y="2769030"/>
+            <a:ext cx="1776448" cy="584775"/>
+          </a:xfrm>
+          <a:prstGeom prst="rect">
+            <a:avLst/>
+          </a:prstGeom>
+          <a:noFill/>
+        </p:spPr>
+        <p:txBody>
+          <a:bodyPr wrap="none" rtlCol="0">
+            <a:spAutoFit/>
+          </a:bodyPr>
+          <a:lstStyle/>
+          <a:p>
+            <a:r>
+              <a:rPr lang="en-US" sz="1600" i="1" dirty="0"/>
+              <a:t>Firewall</a:t>
+            </a:r>
+          </a:p>
+          <a:p>
+            <a:r>
+              <a:rPr lang="en-US" sz="1600" i="1" dirty="0"/>
+              <a:t>AADL Component</a:t>
+            </a:r>
+          </a:p>
+        </p:txBody>
+      </p:sp>
     </p:spTree>
     <p:extLst>
       <p:ext uri="{BB962C8B-B14F-4D97-AF65-F5344CB8AC3E}">
@@ -11026,6 +11149,47 @@
               </a:solidFill>
               <a:effectLst/>
             </a:endParaRPr>
+          </a:p>
+        </p:txBody>
+      </p:sp>
+      <p:sp>
+        <p:nvSpPr>
+          <p:cNvPr id="19" name="TextBox 18">
+            <a:extLst>
+              <a:ext uri="{FF2B5EF4-FFF2-40B4-BE49-F238E27FC236}">
+                <a16:creationId xmlns:a16="http://schemas.microsoft.com/office/drawing/2014/main" id="{FC08826E-8EA5-4957-6760-4B738C79D4AC}"/>
+              </a:ext>
+            </a:extLst>
+          </p:cNvPr>
+          <p:cNvSpPr txBox="1"/>
+          <p:nvPr/>
+        </p:nvSpPr>
+        <p:spPr>
+          <a:xfrm>
+            <a:off x="3791923" y="2769030"/>
+            <a:ext cx="1776448" cy="584775"/>
+          </a:xfrm>
+          <a:prstGeom prst="rect">
+            <a:avLst/>
+          </a:prstGeom>
+          <a:noFill/>
+        </p:spPr>
+        <p:txBody>
+          <a:bodyPr wrap="none" rtlCol="0">
+            <a:spAutoFit/>
+          </a:bodyPr>
+          <a:lstStyle/>
+          <a:p>
+            <a:r>
+              <a:rPr lang="en-US" sz="1600" i="1" dirty="0"/>
+              <a:t>Firewall</a:t>
+            </a:r>
+          </a:p>
+          <a:p>
+            <a:r>
+              <a:rPr lang="en-US" sz="1600" i="1" dirty="0"/>
+              <a:t>AADL Component</a:t>
+            </a:r>
           </a:p>
         </p:txBody>
       </p:sp>

</xml_diff>